<commit_message>
-added Maquette.vsd, Maquette_Lune.vsd .small changes in LogicielStructureSkyguide.docx, Presentation.pptx
</commit_message>
<xml_diff>
--- a/_documents/phase2/Presentation.pptx
+++ b/_documents/phase2/Presentation.pptx
@@ -210,7 +210,7 @@
             <a:fld id="{755590BF-4374-4198-9AC5-1BC3E9F7B02B}" type="datetimeFigureOut">
               <a:rPr lang="fr-CH" smtClean="0"/>
               <a:pPr/>
-              <a:t>21.02.2012</a:t>
+              <a:t>22.02.2012</a:t>
             </a:fld>
             <a:endParaRPr lang="fr-CH"/>
           </a:p>
@@ -277,7 +277,7 @@
             <a:fld id="{5ACF1F31-E5C0-4E1E-A252-FD7AB9A3C755}" type="slidenum">
               <a:rPr lang="fr-CH" smtClean="0"/>
               <a:pPr/>
-              <a:t>‹Nr.›</a:t>
+              <a:t>‹N°›</a:t>
             </a:fld>
             <a:endParaRPr lang="fr-CH"/>
           </a:p>
@@ -377,7 +377,7 @@
             <a:fld id="{1B03F47B-6DE9-40BB-8A26-F1F9686E164F}" type="datetimeFigureOut">
               <a:rPr lang="fr-CH" smtClean="0"/>
               <a:pPr/>
-              <a:t>21.02.2012</a:t>
+              <a:t>22.02.2012</a:t>
             </a:fld>
             <a:endParaRPr lang="fr-CH"/>
           </a:p>
@@ -539,7 +539,7 @@
             <a:fld id="{3D2C3517-FE1A-464E-B5CC-E6A8A692918D}" type="slidenum">
               <a:rPr lang="fr-CH" smtClean="0"/>
               <a:pPr/>
-              <a:t>‹Nr.›</a:t>
+              <a:t>‹N°›</a:t>
             </a:fld>
             <a:endParaRPr lang="fr-CH"/>
           </a:p>
@@ -909,7 +909,7 @@
             <a:fld id="{32BE478D-82A7-4BCE-8E6A-84C9396424F8}" type="datetime1">
               <a:rPr lang="fr-CH" smtClean="0"/>
               <a:pPr/>
-              <a:t>21.02.2012</a:t>
+              <a:t>22.02.2012</a:t>
             </a:fld>
             <a:endParaRPr lang="fr-CH" dirty="0"/>
           </a:p>
@@ -942,7 +942,7 @@
             <a:fld id="{402A8530-ED18-474A-8DE5-327B20C007D8}" type="slidenum">
               <a:rPr lang="fr-CH" smtClean="0"/>
               <a:pPr/>
-              <a:t>‹Nr.›</a:t>
+              <a:t>‹N°›</a:t>
             </a:fld>
             <a:endParaRPr lang="fr-CH" dirty="0"/>
           </a:p>
@@ -1073,7 +1073,7 @@
             <a:fld id="{18EEB9E4-3416-40D6-8464-7E4D827AA6AA}" type="datetime1">
               <a:rPr lang="fr-CH" smtClean="0"/>
               <a:pPr/>
-              <a:t>21.02.2012</a:t>
+              <a:t>22.02.2012</a:t>
             </a:fld>
             <a:endParaRPr lang="fr-CH"/>
           </a:p>
@@ -1097,7 +1097,7 @@
             <a:fld id="{402A8530-ED18-474A-8DE5-327B20C007D8}" type="slidenum">
               <a:rPr lang="fr-CH" smtClean="0"/>
               <a:pPr/>
-              <a:t>‹Nr.›</a:t>
+              <a:t>‹N°›</a:t>
             </a:fld>
             <a:endParaRPr lang="fr-CH"/>
           </a:p>
@@ -1238,7 +1238,7 @@
             <a:fld id="{986ABDAF-ABF5-469C-B70D-98D79AC6D430}" type="datetime1">
               <a:rPr lang="fr-CH" smtClean="0"/>
               <a:pPr/>
-              <a:t>21.02.2012</a:t>
+              <a:t>22.02.2012</a:t>
             </a:fld>
             <a:endParaRPr lang="fr-CH"/>
           </a:p>
@@ -1262,7 +1262,7 @@
             <a:fld id="{402A8530-ED18-474A-8DE5-327B20C007D8}" type="slidenum">
               <a:rPr lang="fr-CH" smtClean="0"/>
               <a:pPr/>
-              <a:t>‹Nr.›</a:t>
+              <a:t>‹N°›</a:t>
             </a:fld>
             <a:endParaRPr lang="fr-CH"/>
           </a:p>
@@ -1393,7 +1393,7 @@
             <a:fld id="{3BC88E30-2DCB-46FD-A393-F9855A67AE1E}" type="datetime1">
               <a:rPr lang="fr-CH" smtClean="0"/>
               <a:pPr/>
-              <a:t>21.02.2012</a:t>
+              <a:t>22.02.2012</a:t>
             </a:fld>
             <a:endParaRPr lang="fr-CH" dirty="0"/>
           </a:p>
@@ -1417,7 +1417,7 @@
             <a:fld id="{402A8530-ED18-474A-8DE5-327B20C007D8}" type="slidenum">
               <a:rPr lang="fr-CH" smtClean="0"/>
               <a:pPr/>
-              <a:t>‹Nr.›</a:t>
+              <a:t>‹N°›</a:t>
             </a:fld>
             <a:endParaRPr lang="fr-CH"/>
           </a:p>
@@ -1625,7 +1625,7 @@
             <a:fld id="{874B6A43-A36D-45FC-B75E-B796E5F4F81A}" type="datetime1">
               <a:rPr lang="fr-CH" smtClean="0"/>
               <a:pPr/>
-              <a:t>21.02.2012</a:t>
+              <a:t>22.02.2012</a:t>
             </a:fld>
             <a:endParaRPr lang="fr-CH"/>
           </a:p>
@@ -1649,7 +1649,7 @@
             <a:fld id="{402A8530-ED18-474A-8DE5-327B20C007D8}" type="slidenum">
               <a:rPr lang="fr-CH" smtClean="0"/>
               <a:pPr/>
-              <a:t>‹Nr.›</a:t>
+              <a:t>‹N°›</a:t>
             </a:fld>
             <a:endParaRPr lang="fr-CH"/>
           </a:p>
@@ -1879,7 +1879,7 @@
             <a:fld id="{89D6589C-F1A0-4149-8FA6-6F849849C0B4}" type="datetime1">
               <a:rPr lang="fr-CH" smtClean="0"/>
               <a:pPr/>
-              <a:t>21.02.2012</a:t>
+              <a:t>22.02.2012</a:t>
             </a:fld>
             <a:endParaRPr lang="fr-CH"/>
           </a:p>
@@ -1903,7 +1903,7 @@
             <a:fld id="{402A8530-ED18-474A-8DE5-327B20C007D8}" type="slidenum">
               <a:rPr lang="fr-CH" smtClean="0"/>
               <a:pPr/>
-              <a:t>‹Nr.›</a:t>
+              <a:t>‹N°›</a:t>
             </a:fld>
             <a:endParaRPr lang="fr-CH"/>
           </a:p>
@@ -2247,7 +2247,7 @@
             <a:fld id="{47944F6D-5C05-4891-9726-36671C592850}" type="datetime1">
               <a:rPr lang="fr-CH" smtClean="0"/>
               <a:pPr/>
-              <a:t>21.02.2012</a:t>
+              <a:t>22.02.2012</a:t>
             </a:fld>
             <a:endParaRPr lang="fr-CH"/>
           </a:p>
@@ -2271,7 +2271,7 @@
             <a:fld id="{402A8530-ED18-474A-8DE5-327B20C007D8}" type="slidenum">
               <a:rPr lang="fr-CH" smtClean="0"/>
               <a:pPr/>
-              <a:t>‹Nr.›</a:t>
+              <a:t>‹N°›</a:t>
             </a:fld>
             <a:endParaRPr lang="fr-CH"/>
           </a:p>
@@ -2387,7 +2387,7 @@
             <a:fld id="{77669498-C631-47CD-9DDA-CB510CC0116B}" type="datetime1">
               <a:rPr lang="fr-CH" smtClean="0"/>
               <a:pPr/>
-              <a:t>21.02.2012</a:t>
+              <a:t>22.02.2012</a:t>
             </a:fld>
             <a:endParaRPr lang="fr-CH"/>
           </a:p>
@@ -2411,7 +2411,7 @@
             <a:fld id="{402A8530-ED18-474A-8DE5-327B20C007D8}" type="slidenum">
               <a:rPr lang="fr-CH" smtClean="0"/>
               <a:pPr/>
-              <a:t>‹Nr.›</a:t>
+              <a:t>‹N°›</a:t>
             </a:fld>
             <a:endParaRPr lang="fr-CH"/>
           </a:p>
@@ -2467,7 +2467,7 @@
             <a:fld id="{8000D7C1-2C08-459A-8294-0CA48A4BFE74}" type="datetime1">
               <a:rPr lang="fr-CH" smtClean="0"/>
               <a:pPr/>
-              <a:t>21.02.2012</a:t>
+              <a:t>22.02.2012</a:t>
             </a:fld>
             <a:endParaRPr lang="fr-CH"/>
           </a:p>
@@ -2491,7 +2491,7 @@
             <a:fld id="{402A8530-ED18-474A-8DE5-327B20C007D8}" type="slidenum">
               <a:rPr lang="fr-CH" smtClean="0"/>
               <a:pPr/>
-              <a:t>‹Nr.›</a:t>
+              <a:t>‹N°›</a:t>
             </a:fld>
             <a:endParaRPr lang="fr-CH"/>
           </a:p>
@@ -2718,7 +2718,7 @@
             <a:fld id="{F1321F0A-9AED-4766-BB37-B38E9C2BD962}" type="datetime1">
               <a:rPr lang="fr-CH" smtClean="0"/>
               <a:pPr/>
-              <a:t>21.02.2012</a:t>
+              <a:t>22.02.2012</a:t>
             </a:fld>
             <a:endParaRPr lang="fr-CH"/>
           </a:p>
@@ -2742,7 +2742,7 @@
             <a:fld id="{402A8530-ED18-474A-8DE5-327B20C007D8}" type="slidenum">
               <a:rPr lang="fr-CH" smtClean="0"/>
               <a:pPr/>
-              <a:t>‹Nr.›</a:t>
+              <a:t>‹N°›</a:t>
             </a:fld>
             <a:endParaRPr lang="fr-CH"/>
           </a:p>
@@ -2996,7 +2996,7 @@
             <a:fld id="{ADB7BCDB-9C25-4DAB-B4E4-31E38CCB3567}" type="datetime1">
               <a:rPr lang="fr-CH" smtClean="0"/>
               <a:pPr/>
-              <a:t>21.02.2012</a:t>
+              <a:t>22.02.2012</a:t>
             </a:fld>
             <a:endParaRPr lang="fr-CH"/>
           </a:p>
@@ -3025,7 +3025,7 @@
             <a:fld id="{402A8530-ED18-474A-8DE5-327B20C007D8}" type="slidenum">
               <a:rPr lang="fr-CH" smtClean="0"/>
               <a:pPr/>
-              <a:t>‹Nr.›</a:t>
+              <a:t>‹N°›</a:t>
             </a:fld>
             <a:endParaRPr lang="fr-CH"/>
           </a:p>
@@ -3758,7 +3758,7 @@
             <a:fld id="{D70E2384-0DC8-451C-86A6-3D7030BB93D5}" type="datetime1">
               <a:rPr lang="fr-CH" smtClean="0"/>
               <a:pPr/>
-              <a:t>21.02.2012</a:t>
+              <a:t>22.02.2012</a:t>
             </a:fld>
             <a:endParaRPr lang="fr-CH" dirty="0"/>
           </a:p>
@@ -3800,7 +3800,7 @@
             <a:fld id="{042AED99-7FB4-404E-8A97-64753DCE42EC}" type="slidenum">
               <a:rPr lang="en-US" smtClean="0"/>
               <a:pPr/>
-              <a:t>‹Nr.›</a:t>
+              <a:t>‹N°›</a:t>
             </a:fld>
             <a:endParaRPr lang="en-US" dirty="0"/>
           </a:p>
@@ -5032,7 +5032,11 @@
           <a:p>
             <a:r>
               <a:rPr lang="fr-CH" dirty="0" smtClean="0"/>
-              <a:t>Diagramme de Gant.</a:t>
+              <a:t>Diagramme de </a:t>
+            </a:r>
+            <a:r>
+              <a:rPr lang="fr-CH" dirty="0" smtClean="0"/>
+              <a:t>Gantt.</a:t>
             </a:r>
             <a:endParaRPr lang="fr-CH" dirty="0"/>
           </a:p>
@@ -5056,7 +5060,7 @@
             <a:fld id="{3BC88E30-2DCB-46FD-A393-F9855A67AE1E}" type="datetime1">
               <a:rPr lang="fr-CH" smtClean="0"/>
               <a:pPr/>
-              <a:t>21.02.2012</a:t>
+              <a:t>22.02.2012</a:t>
             </a:fld>
             <a:endParaRPr lang="fr-CH" dirty="0"/>
           </a:p>
@@ -5156,12 +5160,7 @@
             <p:ph idx="1"/>
           </p:nvPr>
         </p:nvSpPr>
-        <p:spPr>
-          <a:xfrm>
-            <a:off x="457200" y="1935480"/>
-            <a:ext cx="8229600" cy="4373840"/>
-          </a:xfrm>
-        </p:spPr>
+        <p:spPr/>
         <p:txBody>
           <a:bodyPr>
             <a:normAutofit fontScale="62500" lnSpcReduction="20000"/>
@@ -5170,110 +5169,119 @@
           <a:p>
             <a:pPr lvl="0"/>
             <a:r>
-              <a:rPr lang="fr-FR" sz="3400" dirty="0" smtClean="0"/>
+              <a:rPr lang="fr-CH" sz="3400" dirty="0"/>
               <a:t>devoir recevoir:</a:t>
             </a:r>
           </a:p>
           <a:p>
             <a:pPr lvl="1"/>
             <a:r>
-              <a:rPr lang="fr-FR" sz="3400" dirty="0" smtClean="0"/>
+              <a:rPr lang="fr-CH" sz="3400" dirty="0"/>
               <a:t>coordonnées GPS</a:t>
             </a:r>
           </a:p>
           <a:p>
             <a:pPr lvl="1"/>
             <a:r>
-              <a:rPr lang="fr-FR" sz="3400" dirty="0" smtClean="0"/>
-              <a:t>Inclinaison du pointeur:[-90°;90°]     [-90°;90°]</a:t>
+              <a:rPr lang="fr-CH" sz="3400" dirty="0"/>
+              <a:t>Inclinaison du pointeur: angle avec le sol [-90°;90°]     [-90°;90°]</a:t>
             </a:r>
           </a:p>
           <a:p>
             <a:pPr lvl="1"/>
             <a:r>
-              <a:rPr lang="fr-FR" sz="3400" dirty="0" smtClean="0"/>
+              <a:rPr lang="fr-CH" sz="3400" dirty="0"/>
               <a:t>Orientation [0°;360°]</a:t>
             </a:r>
           </a:p>
           <a:p>
             <a:pPr lvl="1"/>
             <a:r>
-              <a:rPr lang="fr-FR" sz="3400" dirty="0" smtClean="0"/>
-              <a:t>(date et l’heure actuelle/GPS)</a:t>
+              <a:rPr lang="fr-CH" sz="3400" dirty="0"/>
+              <a:t>(date et l’heure actuelle)</a:t>
             </a:r>
           </a:p>
           <a:p>
             <a:pPr lvl="0">
               <a:spcBef>
-                <a:spcPts val="1800"/>
+                <a:spcPts val="1500"/>
               </a:spcBef>
             </a:pPr>
             <a:r>
-              <a:rPr lang="fr-FR" sz="3400" dirty="0" smtClean="0"/>
+              <a:rPr lang="fr-CH" sz="3400" dirty="0"/>
               <a:t>Un envoi contient toutes les informations</a:t>
             </a:r>
           </a:p>
           <a:p>
             <a:pPr lvl="0">
               <a:spcBef>
-                <a:spcPts val="1800"/>
+                <a:spcPts val="1500"/>
               </a:spcBef>
             </a:pPr>
             <a:r>
-              <a:rPr lang="fr-FR" sz="3400" dirty="0" smtClean="0"/>
+              <a:rPr lang="fr-CH" sz="3400" dirty="0"/>
               <a:t>Unidirectionnel</a:t>
             </a:r>
           </a:p>
           <a:p>
             <a:pPr lvl="0">
               <a:spcBef>
-                <a:spcPts val="1800"/>
+                <a:spcPts val="1500"/>
               </a:spcBef>
             </a:pPr>
             <a:r>
-              <a:rPr lang="fr-FR" sz="3400" dirty="0" smtClean="0"/>
-              <a:t>Configuration du ligne rester a définir</a:t>
-            </a:r>
-            <a:endParaRPr lang="fr-FR" sz="3400" dirty="0" smtClean="0"/>
+              <a:rPr lang="fr-CH" sz="3400" dirty="0" smtClean="0"/>
+              <a:t>Paramètre de configurations</a:t>
+            </a:r>
           </a:p>
           <a:p>
             <a:pPr lvl="0">
               <a:spcBef>
-                <a:spcPts val="1800"/>
+                <a:spcPts val="1500"/>
               </a:spcBef>
             </a:pPr>
             <a:r>
-              <a:rPr lang="fr-FR" sz="3400" dirty="0" smtClean="0"/>
-              <a:t>Forme d’une transmission </a:t>
+              <a:rPr lang="fr-CH" sz="3400" dirty="0" smtClean="0"/>
+              <a:t>Forme </a:t>
+            </a:r>
+            <a:r>
+              <a:rPr lang="fr-CH" sz="3400" dirty="0"/>
+              <a:t>d’une </a:t>
+            </a:r>
+            <a:r>
+              <a:rPr lang="fr-CH" sz="3400" dirty="0" smtClean="0"/>
+              <a:t>transmission</a:t>
             </a:r>
             <a:br>
-              <a:rPr lang="fr-FR" sz="3400" dirty="0" smtClean="0"/>
+              <a:rPr lang="fr-CH" sz="3400" dirty="0" smtClean="0"/>
             </a:br>
             <a:r>
-              <a:rPr lang="fr-FR" sz="3400" dirty="0" smtClean="0"/>
-              <a:t>«[coordonnés </a:t>
-            </a:r>
-            <a:r>
-              <a:rPr lang="fr-FR" sz="3400" dirty="0"/>
-              <a:t>GPS];[</a:t>
-            </a:r>
-            <a:r>
-              <a:rPr lang="fr-FR" sz="3400" dirty="0" smtClean="0"/>
-              <a:t>Inclinaison</a:t>
-            </a:r>
-            <a:r>
-              <a:rPr lang="fr-FR" sz="3400" dirty="0" smtClean="0"/>
-              <a:t>];[Orientation];[</a:t>
-            </a:r>
-            <a:r>
-              <a:rPr lang="fr-FR" sz="3400" dirty="0" err="1" smtClean="0"/>
+              <a:rPr lang="fr-CH" sz="3400" dirty="0" smtClean="0"/>
+              <a:t>«[</a:t>
+            </a:r>
+            <a:r>
+              <a:rPr lang="fr-CH" sz="3400" dirty="0"/>
+              <a:t>coordonnés GPS];[</a:t>
+            </a:r>
+            <a:r>
+              <a:rPr lang="fr-CH" sz="3400" dirty="0" smtClean="0"/>
+              <a:t>Inclinaison];[</a:t>
+            </a:r>
+            <a:r>
+              <a:rPr lang="fr-CH" sz="3400" dirty="0"/>
+              <a:t>Orientation];[</a:t>
+            </a:r>
+            <a:r>
+              <a:rPr lang="fr-CH" sz="3400" dirty="0" err="1"/>
               <a:t>dateHeure</a:t>
             </a:r>
             <a:r>
-              <a:rPr lang="fr-FR" sz="3400" dirty="0" smtClean="0"/>
+              <a:rPr lang="fr-CH" sz="3400" dirty="0"/>
               <a:t>]»</a:t>
             </a:r>
-            <a:endParaRPr lang="fr-FR" dirty="0"/>
+          </a:p>
+          <a:p>
+            <a:endParaRPr lang="fr-CH" dirty="0"/>
           </a:p>
         </p:txBody>
       </p:sp>
@@ -5295,7 +5303,7 @@
             <a:fld id="{3BC88E30-2DCB-46FD-A393-F9855A67AE1E}" type="datetime1">
               <a:rPr lang="fr-CH" smtClean="0"/>
               <a:pPr/>
-              <a:t>21.02.2012</a:t>
+              <a:t>22.02.2012</a:t>
             </a:fld>
             <a:endParaRPr lang="fr-CH" dirty="0"/>
           </a:p>
@@ -5325,80 +5333,6 @@
           </a:p>
         </p:txBody>
       </p:sp>
-      <p:cxnSp>
-        <p:nvCxnSpPr>
-          <p:cNvPr id="12" name="Gerade Verbindung mit Pfeil 11"/>
-          <p:cNvCxnSpPr/>
-          <p:nvPr/>
-        </p:nvCxnSpPr>
-        <p:spPr>
-          <a:xfrm flipV="1">
-            <a:off x="5220072" y="2564904"/>
-            <a:ext cx="0" cy="409317"/>
-          </a:xfrm>
-          <a:prstGeom prst="straightConnector1">
-            <a:avLst/>
-          </a:prstGeom>
-          <a:ln w="19050">
-            <a:solidFill>
-              <a:schemeClr val="tx1"/>
-            </a:solidFill>
-            <a:headEnd type="arrow"/>
-            <a:tailEnd type="arrow"/>
-          </a:ln>
-        </p:spPr>
-        <p:style>
-          <a:lnRef idx="1">
-            <a:schemeClr val="accent1"/>
-          </a:lnRef>
-          <a:fillRef idx="0">
-            <a:schemeClr val="accent1"/>
-          </a:fillRef>
-          <a:effectRef idx="0">
-            <a:schemeClr val="accent1"/>
-          </a:effectRef>
-          <a:fontRef idx="minor">
-            <a:schemeClr val="tx1"/>
-          </a:fontRef>
-        </p:style>
-      </p:cxnSp>
-      <p:cxnSp>
-        <p:nvCxnSpPr>
-          <p:cNvPr id="13" name="Gerade Verbindung mit Pfeil 12"/>
-          <p:cNvCxnSpPr/>
-          <p:nvPr/>
-        </p:nvCxnSpPr>
-        <p:spPr>
-          <a:xfrm>
-            <a:off x="6516216" y="2764482"/>
-            <a:ext cx="576064" cy="5080"/>
-          </a:xfrm>
-          <a:prstGeom prst="straightConnector1">
-            <a:avLst/>
-          </a:prstGeom>
-          <a:ln w="19050">
-            <a:solidFill>
-              <a:schemeClr val="tx1"/>
-            </a:solidFill>
-            <a:headEnd type="arrow"/>
-            <a:tailEnd type="arrow"/>
-          </a:ln>
-        </p:spPr>
-        <p:style>
-          <a:lnRef idx="1">
-            <a:schemeClr val="accent1"/>
-          </a:lnRef>
-          <a:fillRef idx="0">
-            <a:schemeClr val="accent1"/>
-          </a:fillRef>
-          <a:effectRef idx="0">
-            <a:schemeClr val="accent1"/>
-          </a:effectRef>
-          <a:fontRef idx="minor">
-            <a:schemeClr val="tx1"/>
-          </a:fontRef>
-        </p:style>
-      </p:cxnSp>
     </p:spTree>
     <p:extLst>
       <p:ext uri="{BB962C8B-B14F-4D97-AF65-F5344CB8AC3E}">
@@ -5500,7 +5434,7 @@
             <a:fld id="{3BC88E30-2DCB-46FD-A393-F9855A67AE1E}" type="datetime1">
               <a:rPr lang="fr-CH" smtClean="0"/>
               <a:pPr/>
-              <a:t>21.02.2012</a:t>
+              <a:t>22.02.2012</a:t>
             </a:fld>
             <a:endParaRPr lang="fr-CH" dirty="0"/>
           </a:p>
@@ -5683,7 +5617,7 @@
             <a:fld id="{3BC88E30-2DCB-46FD-A393-F9855A67AE1E}" type="datetime1">
               <a:rPr lang="fr-CH" smtClean="0"/>
               <a:pPr/>
-              <a:t>21.02.2012</a:t>
+              <a:t>22.02.2012</a:t>
             </a:fld>
             <a:endParaRPr lang="fr-CH"/>
           </a:p>
@@ -5827,7 +5761,7 @@
             <a:fld id="{3BC88E30-2DCB-46FD-A393-F9855A67AE1E}" type="datetime1">
               <a:rPr lang="fr-CH" smtClean="0"/>
               <a:pPr/>
-              <a:t>21.02.2012</a:t>
+              <a:t>22.02.2012</a:t>
             </a:fld>
             <a:endParaRPr lang="fr-CH"/>
           </a:p>
@@ -6065,7 +5999,7 @@
             <a:fld id="{3BC88E30-2DCB-46FD-A393-F9855A67AE1E}" type="datetime1">
               <a:rPr lang="fr-CH" smtClean="0"/>
               <a:pPr/>
-              <a:t>21.02.2012</a:t>
+              <a:t>22.02.2012</a:t>
             </a:fld>
             <a:endParaRPr lang="fr-CH"/>
           </a:p>
@@ -6302,7 +6236,7 @@
             <a:fld id="{3BC88E30-2DCB-46FD-A393-F9855A67AE1E}" type="datetime1">
               <a:rPr lang="fr-CH" smtClean="0"/>
               <a:pPr/>
-              <a:t>21.02.2012</a:t>
+              <a:t>22.02.2012</a:t>
             </a:fld>
             <a:endParaRPr lang="fr-CH"/>
           </a:p>
@@ -6413,7 +6347,7 @@
             <a:fld id="{3BC88E30-2DCB-46FD-A393-F9855A67AE1E}" type="datetime1">
               <a:rPr lang="fr-CH" smtClean="0"/>
               <a:pPr/>
-              <a:t>21.02.2012</a:t>
+              <a:t>22.02.2012</a:t>
             </a:fld>
             <a:endParaRPr lang="fr-CH"/>
           </a:p>
@@ -6782,7 +6716,212 @@
   <p:timing>
     <p:tnLst>
       <p:par>
-        <p:cTn id="1" dur="indefinite" restart="never" nodeType="tmRoot"/>
+        <p:cTn id="1" dur="indefinite" restart="never" nodeType="tmRoot">
+          <p:childTnLst>
+            <p:seq concurrent="1" nextAc="seek">
+              <p:cTn id="2" dur="indefinite" nodeType="mainSeq">
+                <p:childTnLst>
+                  <p:par>
+                    <p:cTn id="3" fill="hold">
+                      <p:stCondLst>
+                        <p:cond delay="indefinite"/>
+                      </p:stCondLst>
+                      <p:childTnLst>
+                        <p:par>
+                          <p:cTn id="4" fill="hold">
+                            <p:stCondLst>
+                              <p:cond delay="0"/>
+                            </p:stCondLst>
+                            <p:childTnLst>
+                              <p:par>
+                                <p:cTn id="5" presetID="2" presetClass="entr" presetSubtype="4" fill="hold" nodeType="clickEffect">
+                                  <p:stCondLst>
+                                    <p:cond delay="0"/>
+                                  </p:stCondLst>
+                                  <p:childTnLst>
+                                    <p:set>
+                                      <p:cBhvr>
+                                        <p:cTn id="6" dur="1" fill="hold">
+                                          <p:stCondLst>
+                                            <p:cond delay="0"/>
+                                          </p:stCondLst>
+                                        </p:cTn>
+                                        <p:tgtEl>
+                                          <p:spTgt spid="1026"/>
+                                        </p:tgtEl>
+                                        <p:attrNameLst>
+                                          <p:attrName>style.visibility</p:attrName>
+                                        </p:attrNameLst>
+                                      </p:cBhvr>
+                                      <p:to>
+                                        <p:strVal val="visible"/>
+                                      </p:to>
+                                    </p:set>
+                                    <p:anim calcmode="lin" valueType="num">
+                                      <p:cBhvr additive="base">
+                                        <p:cTn id="7" dur="500" fill="hold"/>
+                                        <p:tgtEl>
+                                          <p:spTgt spid="1026"/>
+                                        </p:tgtEl>
+                                        <p:attrNameLst>
+                                          <p:attrName>ppt_x</p:attrName>
+                                        </p:attrNameLst>
+                                      </p:cBhvr>
+                                      <p:tavLst>
+                                        <p:tav tm="0">
+                                          <p:val>
+                                            <p:strVal val="#ppt_x"/>
+                                          </p:val>
+                                        </p:tav>
+                                        <p:tav tm="100000">
+                                          <p:val>
+                                            <p:strVal val="#ppt_x"/>
+                                          </p:val>
+                                        </p:tav>
+                                      </p:tavLst>
+                                    </p:anim>
+                                    <p:anim calcmode="lin" valueType="num">
+                                      <p:cBhvr additive="base">
+                                        <p:cTn id="8" dur="500" fill="hold"/>
+                                        <p:tgtEl>
+                                          <p:spTgt spid="1026"/>
+                                        </p:tgtEl>
+                                        <p:attrNameLst>
+                                          <p:attrName>ppt_y</p:attrName>
+                                        </p:attrNameLst>
+                                      </p:cBhvr>
+                                      <p:tavLst>
+                                        <p:tav tm="0">
+                                          <p:val>
+                                            <p:strVal val="1+#ppt_h/2"/>
+                                          </p:val>
+                                        </p:tav>
+                                        <p:tav tm="100000">
+                                          <p:val>
+                                            <p:strVal val="#ppt_y"/>
+                                          </p:val>
+                                        </p:tav>
+                                      </p:tavLst>
+                                    </p:anim>
+                                  </p:childTnLst>
+                                </p:cTn>
+                              </p:par>
+                            </p:childTnLst>
+                          </p:cTn>
+                        </p:par>
+                      </p:childTnLst>
+                    </p:cTn>
+                  </p:par>
+                  <p:par>
+                    <p:cTn id="9" fill="hold">
+                      <p:stCondLst>
+                        <p:cond delay="indefinite"/>
+                      </p:stCondLst>
+                      <p:childTnLst>
+                        <p:par>
+                          <p:cTn id="10" fill="hold">
+                            <p:stCondLst>
+                              <p:cond delay="0"/>
+                            </p:stCondLst>
+                            <p:childTnLst>
+                              <p:par>
+                                <p:cTn id="11" presetID="2" presetClass="entr" presetSubtype="4" fill="hold" nodeType="clickEffect">
+                                  <p:stCondLst>
+                                    <p:cond delay="0"/>
+                                  </p:stCondLst>
+                                  <p:childTnLst>
+                                    <p:set>
+                                      <p:cBhvr>
+                                        <p:cTn id="12" dur="1" fill="hold">
+                                          <p:stCondLst>
+                                            <p:cond delay="0"/>
+                                          </p:stCondLst>
+                                        </p:cTn>
+                                        <p:tgtEl>
+                                          <p:spTgt spid="1027"/>
+                                        </p:tgtEl>
+                                        <p:attrNameLst>
+                                          <p:attrName>style.visibility</p:attrName>
+                                        </p:attrNameLst>
+                                      </p:cBhvr>
+                                      <p:to>
+                                        <p:strVal val="visible"/>
+                                      </p:to>
+                                    </p:set>
+                                    <p:anim calcmode="lin" valueType="num">
+                                      <p:cBhvr additive="base">
+                                        <p:cTn id="13" dur="500" fill="hold"/>
+                                        <p:tgtEl>
+                                          <p:spTgt spid="1027"/>
+                                        </p:tgtEl>
+                                        <p:attrNameLst>
+                                          <p:attrName>ppt_x</p:attrName>
+                                        </p:attrNameLst>
+                                      </p:cBhvr>
+                                      <p:tavLst>
+                                        <p:tav tm="0">
+                                          <p:val>
+                                            <p:strVal val="#ppt_x"/>
+                                          </p:val>
+                                        </p:tav>
+                                        <p:tav tm="100000">
+                                          <p:val>
+                                            <p:strVal val="#ppt_x"/>
+                                          </p:val>
+                                        </p:tav>
+                                      </p:tavLst>
+                                    </p:anim>
+                                    <p:anim calcmode="lin" valueType="num">
+                                      <p:cBhvr additive="base">
+                                        <p:cTn id="14" dur="500" fill="hold"/>
+                                        <p:tgtEl>
+                                          <p:spTgt spid="1027"/>
+                                        </p:tgtEl>
+                                        <p:attrNameLst>
+                                          <p:attrName>ppt_y</p:attrName>
+                                        </p:attrNameLst>
+                                      </p:cBhvr>
+                                      <p:tavLst>
+                                        <p:tav tm="0">
+                                          <p:val>
+                                            <p:strVal val="1+#ppt_h/2"/>
+                                          </p:val>
+                                        </p:tav>
+                                        <p:tav tm="100000">
+                                          <p:val>
+                                            <p:strVal val="#ppt_y"/>
+                                          </p:val>
+                                        </p:tav>
+                                      </p:tavLst>
+                                    </p:anim>
+                                  </p:childTnLst>
+                                </p:cTn>
+                              </p:par>
+                            </p:childTnLst>
+                          </p:cTn>
+                        </p:par>
+                      </p:childTnLst>
+                    </p:cTn>
+                  </p:par>
+                </p:childTnLst>
+              </p:cTn>
+              <p:prevCondLst>
+                <p:cond evt="onPrev" delay="0">
+                  <p:tgtEl>
+                    <p:sldTgt/>
+                  </p:tgtEl>
+                </p:cond>
+              </p:prevCondLst>
+              <p:nextCondLst>
+                <p:cond evt="onNext" delay="0">
+                  <p:tgtEl>
+                    <p:sldTgt/>
+                  </p:tgtEl>
+                </p:cond>
+              </p:nextCondLst>
+            </p:seq>
+          </p:childTnLst>
+        </p:cTn>
       </p:par>
     </p:tnLst>
   </p:timing>
@@ -6891,7 +7030,7 @@
             <a:fld id="{3BC88E30-2DCB-46FD-A393-F9855A67AE1E}" type="datetime1">
               <a:rPr lang="fr-CH" smtClean="0"/>
               <a:pPr/>
-              <a:t>21.02.2012</a:t>
+              <a:t>22.02.2012</a:t>
             </a:fld>
             <a:endParaRPr lang="fr-CH" dirty="0"/>
           </a:p>
@@ -7009,7 +7148,7 @@
             <a:fld id="{3BC88E30-2DCB-46FD-A393-F9855A67AE1E}" type="datetime1">
               <a:rPr lang="fr-CH" smtClean="0"/>
               <a:pPr/>
-              <a:t>21.02.2012</a:t>
+              <a:t>22.02.2012</a:t>
             </a:fld>
             <a:endParaRPr lang="fr-CH"/>
           </a:p>
@@ -7392,7 +7531,7 @@
             <a:fld id="{3BC88E30-2DCB-46FD-A393-F9855A67AE1E}" type="datetime1">
               <a:rPr lang="fr-CH" smtClean="0"/>
               <a:pPr/>
-              <a:t>21.02.2012</a:t>
+              <a:t>22.02.2012</a:t>
             </a:fld>
             <a:endParaRPr lang="fr-CH"/>
           </a:p>
@@ -7694,7 +7833,7 @@
           <a:graphicData uri="http://schemas.openxmlformats.org/presentationml/2006/ole">
             <mc:AlternateContent xmlns:mc="http://schemas.openxmlformats.org/markup-compatibility/2006">
               <mc:Choice xmlns:v="urn:schemas-microsoft-com:vml" Requires="v">
-                <p:oleObj spid="_x0000_s2086" name="Visio" r:id="rId3" imgW="5231665" imgH="3034260" progId="Visio.Drawing.11">
+                <p:oleObj spid="_x0000_s2082" name="Visio" r:id="rId3" imgW="5231665" imgH="3034260" progId="Visio.Drawing.11">
                   <p:embed/>
                 </p:oleObj>
               </mc:Choice>
@@ -7925,8 +8064,8 @@
               <a:t>La </a:t>
             </a:r>
             <a:r>
-              <a:rPr lang="fr-CH" sz="3600" dirty="0" err="1"/>
-              <a:t>declinaison</a:t>
+              <a:rPr lang="fr-CH" sz="3600" dirty="0" smtClean="0"/>
+              <a:t>hauteur</a:t>
             </a:r>
             <a:endParaRPr lang="fr-CH" sz="3600" dirty="0"/>
           </a:p>
@@ -8662,7 +8801,7 @@
             <a:fld id="{3BC88E30-2DCB-46FD-A393-F9855A67AE1E}" type="datetime1">
               <a:rPr lang="fr-CH" smtClean="0"/>
               <a:pPr/>
-              <a:t>21.02.2012</a:t>
+              <a:t>22.02.2012</a:t>
             </a:fld>
             <a:endParaRPr lang="fr-CH" dirty="0"/>
           </a:p>

</xml_diff>